<commit_message>
update day 3 materials
</commit_message>
<xml_diff>
--- a/powerpoint/UNIQ+Day1_students.pptx
+++ b/powerpoint/UNIQ+Day1_students.pptx
@@ -142,7 +142,6 @@
 <file path=ppt/revisionInfo.xml><?xml version="1.0" encoding="utf-8"?>
 <p1510:revInfo xmlns:a="http://schemas.openxmlformats.org/drawingml/2006/main" xmlns:r="http://schemas.openxmlformats.org/officeDocument/2006/relationships" xmlns:p1510="http://schemas.microsoft.com/office/powerpoint/2015/10/main">
   <p1510:revLst>
-    <p1510:client id="{A1DE7FA8-B3E9-0345-B325-0F983846FA45}" v="188" dt="2023-07-04T19:37:23.386"/>
     <p1510:client id="{B993B99C-C75D-8341-9EAD-C01C2473A5DE}" v="1" dt="2023-07-04T21:13:55.657"/>
   </p1510:revLst>
 </p1510:revInfo>
@@ -2719,7 +2718,7 @@
   <pc:docChgLst>
     <pc:chgData name="Srinivasa Rao" userId="a6b54366-f13d-4292-8bb4-f06c50909b1e" providerId="ADAL" clId="{B993B99C-C75D-8341-9EAD-C01C2473A5DE}"/>
     <pc:docChg chg="undo custSel addSld delSld modSld">
-      <pc:chgData name="Srinivasa Rao" userId="a6b54366-f13d-4292-8bb4-f06c50909b1e" providerId="ADAL" clId="{B993B99C-C75D-8341-9EAD-C01C2473A5DE}" dt="2023-07-04T21:15:09.605" v="59" actId="2696"/>
+      <pc:chgData name="Srinivasa Rao" userId="a6b54366-f13d-4292-8bb4-f06c50909b1e" providerId="ADAL" clId="{B993B99C-C75D-8341-9EAD-C01C2473A5DE}" dt="2023-07-06T08:21:48.258" v="68" actId="20577"/>
       <pc:docMkLst>
         <pc:docMk/>
       </pc:docMkLst>
@@ -2746,13 +2745,13 @@
         </pc:spChg>
       </pc:sldChg>
       <pc:sldChg chg="modSp add mod">
-        <pc:chgData name="Srinivasa Rao" userId="a6b54366-f13d-4292-8bb4-f06c50909b1e" providerId="ADAL" clId="{B993B99C-C75D-8341-9EAD-C01C2473A5DE}" dt="2023-07-04T21:14:03.801" v="58" actId="20577"/>
+        <pc:chgData name="Srinivasa Rao" userId="a6b54366-f13d-4292-8bb4-f06c50909b1e" providerId="ADAL" clId="{B993B99C-C75D-8341-9EAD-C01C2473A5DE}" dt="2023-07-06T08:21:48.258" v="68" actId="20577"/>
         <pc:sldMkLst>
           <pc:docMk/>
           <pc:sldMk cId="3951339930" sldId="284"/>
         </pc:sldMkLst>
         <pc:spChg chg="mod">
-          <ac:chgData name="Srinivasa Rao" userId="a6b54366-f13d-4292-8bb4-f06c50909b1e" providerId="ADAL" clId="{B993B99C-C75D-8341-9EAD-C01C2473A5DE}" dt="2023-07-04T21:14:03.801" v="58" actId="20577"/>
+          <ac:chgData name="Srinivasa Rao" userId="a6b54366-f13d-4292-8bb4-f06c50909b1e" providerId="ADAL" clId="{B993B99C-C75D-8341-9EAD-C01C2473A5DE}" dt="2023-07-06T08:21:48.258" v="68" actId="20577"/>
           <ac:spMkLst>
             <pc:docMk/>
             <pc:sldMk cId="3951339930" sldId="284"/>
@@ -2914,7 +2913,7 @@
           <a:p>
             <a:fld id="{950BEE4A-2997-C84B-8DCB-C7602CF9D705}" type="datetimeFigureOut">
               <a:rPr lang="en-US" smtClean="0"/>
-              <a:t>7/4/23</a:t>
+              <a:t>7/6/23</a:t>
             </a:fld>
             <a:endParaRPr lang="en-US"/>
           </a:p>
@@ -3114,7 +3113,7 @@
           <a:p>
             <a:fld id="{950BEE4A-2997-C84B-8DCB-C7602CF9D705}" type="datetimeFigureOut">
               <a:rPr lang="en-US" smtClean="0"/>
-              <a:t>7/4/23</a:t>
+              <a:t>7/6/23</a:t>
             </a:fld>
             <a:endParaRPr lang="en-US"/>
           </a:p>
@@ -3324,7 +3323,7 @@
           <a:p>
             <a:fld id="{950BEE4A-2997-C84B-8DCB-C7602CF9D705}" type="datetimeFigureOut">
               <a:rPr lang="en-US" smtClean="0"/>
-              <a:t>7/4/23</a:t>
+              <a:t>7/6/23</a:t>
             </a:fld>
             <a:endParaRPr lang="en-US"/>
           </a:p>
@@ -3524,7 +3523,7 @@
           <a:p>
             <a:fld id="{950BEE4A-2997-C84B-8DCB-C7602CF9D705}" type="datetimeFigureOut">
               <a:rPr lang="en-US" smtClean="0"/>
-              <a:t>7/4/23</a:t>
+              <a:t>7/6/23</a:t>
             </a:fld>
             <a:endParaRPr lang="en-US"/>
           </a:p>
@@ -3800,7 +3799,7 @@
           <a:p>
             <a:fld id="{950BEE4A-2997-C84B-8DCB-C7602CF9D705}" type="datetimeFigureOut">
               <a:rPr lang="en-US" smtClean="0"/>
-              <a:t>7/4/23</a:t>
+              <a:t>7/6/23</a:t>
             </a:fld>
             <a:endParaRPr lang="en-US"/>
           </a:p>
@@ -4068,7 +4067,7 @@
           <a:p>
             <a:fld id="{950BEE4A-2997-C84B-8DCB-C7602CF9D705}" type="datetimeFigureOut">
               <a:rPr lang="en-US" smtClean="0"/>
-              <a:t>7/4/23</a:t>
+              <a:t>7/6/23</a:t>
             </a:fld>
             <a:endParaRPr lang="en-US"/>
           </a:p>
@@ -4483,7 +4482,7 @@
           <a:p>
             <a:fld id="{950BEE4A-2997-C84B-8DCB-C7602CF9D705}" type="datetimeFigureOut">
               <a:rPr lang="en-US" smtClean="0"/>
-              <a:t>7/4/23</a:t>
+              <a:t>7/6/23</a:t>
             </a:fld>
             <a:endParaRPr lang="en-US"/>
           </a:p>
@@ -4625,7 +4624,7 @@
           <a:p>
             <a:fld id="{950BEE4A-2997-C84B-8DCB-C7602CF9D705}" type="datetimeFigureOut">
               <a:rPr lang="en-US" smtClean="0"/>
-              <a:t>7/4/23</a:t>
+              <a:t>7/6/23</a:t>
             </a:fld>
             <a:endParaRPr lang="en-US"/>
           </a:p>
@@ -4738,7 +4737,7 @@
           <a:p>
             <a:fld id="{950BEE4A-2997-C84B-8DCB-C7602CF9D705}" type="datetimeFigureOut">
               <a:rPr lang="en-US" smtClean="0"/>
-              <a:t>7/4/23</a:t>
+              <a:t>7/6/23</a:t>
             </a:fld>
             <a:endParaRPr lang="en-US"/>
           </a:p>
@@ -5051,7 +5050,7 @@
           <a:p>
             <a:fld id="{950BEE4A-2997-C84B-8DCB-C7602CF9D705}" type="datetimeFigureOut">
               <a:rPr lang="en-US" smtClean="0"/>
-              <a:t>7/4/23</a:t>
+              <a:t>7/6/23</a:t>
             </a:fld>
             <a:endParaRPr lang="en-US"/>
           </a:p>
@@ -5340,7 +5339,7 @@
           <a:p>
             <a:fld id="{950BEE4A-2997-C84B-8DCB-C7602CF9D705}" type="datetimeFigureOut">
               <a:rPr lang="en-US" smtClean="0"/>
-              <a:t>7/4/23</a:t>
+              <a:t>7/6/23</a:t>
             </a:fld>
             <a:endParaRPr lang="en-US"/>
           </a:p>
@@ -5583,7 +5582,7 @@
           <a:p>
             <a:fld id="{950BEE4A-2997-C84B-8DCB-C7602CF9D705}" type="datetimeFigureOut">
               <a:rPr lang="en-US" smtClean="0"/>
-              <a:t>7/4/23</a:t>
+              <a:t>7/6/23</a:t>
             </a:fld>
             <a:endParaRPr lang="en-US"/>
           </a:p>
@@ -6057,24 +6056,16 @@
           <a:lstStyle/>
           <a:p>
             <a:r>
-              <a:rPr lang="en-US"/>
-              <a:t>Wednesday </a:t>
-            </a:r>
-            <a:r>
               <a:rPr lang="en-US" dirty="0"/>
-              <a:t>5</a:t>
-            </a:r>
-            <a:r>
-              <a:rPr lang="en-US" baseline="30000"/>
+              <a:t>Wednesday 5</a:t>
+            </a:r>
+            <a:r>
+              <a:rPr lang="en-US" baseline="30000" dirty="0"/>
               <a:t>th</a:t>
             </a:r>
             <a:r>
-              <a:rPr lang="en-US"/>
-              <a:t> </a:t>
-            </a:r>
-            <a:r>
               <a:rPr lang="en-US" dirty="0"/>
-              <a:t>July</a:t>
+              <a:t> July</a:t>
             </a:r>
           </a:p>
         </p:txBody>

</xml_diff>